<commit_message>
Teoria de Compiladores Yduqs 2022_2 - 26102022
</commit_message>
<xml_diff>
--- a/01 Classes/Aula 03 Teoria de Compiladores - Linguagens de programação.pptx
+++ b/01 Classes/Aula 03 Teoria de Compiladores - Linguagens de programação.pptx
@@ -6773,14 +6773,24 @@
               <a:buNone/>
             </a:pPr>
             <a:r>
-              <a:rPr lang="pt-BR" dirty="0">
+              <a:rPr lang="pt-BR" sz="2400" dirty="0">
                 <a:solidFill>
                   <a:schemeClr val="tx1"/>
                 </a:solidFill>
                 <a:latin typeface="Times New Roman" panose="02020603050405020304" pitchFamily="18" charset="0"/>
                 <a:cs typeface="Times New Roman" panose="02020603050405020304" pitchFamily="18" charset="0"/>
               </a:rPr>
-              <a:t> </a:t>
+              <a:t>- </a:t>
+            </a:r>
+            <a:r>
+              <a:rPr lang="pt-BR" sz="2400" b="1" dirty="0">
+                <a:solidFill>
+                  <a:schemeClr val="tx1"/>
+                </a:solidFill>
+                <a:latin typeface="Times New Roman" panose="02020603050405020304" pitchFamily="18" charset="0"/>
+                <a:cs typeface="Times New Roman" panose="02020603050405020304" pitchFamily="18" charset="0"/>
+              </a:rPr>
+              <a:t>Vídeo</a:t>
             </a:r>
           </a:p>
           <a:p>
@@ -6788,31 +6798,27 @@
               <a:buNone/>
             </a:pPr>
             <a:r>
-              <a:rPr lang="pt-BR" dirty="0">
+              <a:rPr lang="pt-BR" sz="2400" dirty="0">
                 <a:solidFill>
                   <a:schemeClr val="tx1"/>
                 </a:solidFill>
                 <a:latin typeface="Times New Roman" panose="02020603050405020304" pitchFamily="18" charset="0"/>
                 <a:cs typeface="Times New Roman" panose="02020603050405020304" pitchFamily="18" charset="0"/>
               </a:rPr>
-              <a:t>- </a:t>
-            </a:r>
-            <a:r>
-              <a:rPr lang="pt-BR" b="1" dirty="0">
+              <a:t>	</a:t>
+            </a:r>
+            <a:r>
+              <a:rPr lang="pt-BR" sz="2400" dirty="0">
                 <a:solidFill>
                   <a:schemeClr val="tx1"/>
                 </a:solidFill>
                 <a:latin typeface="Times New Roman" panose="02020603050405020304" pitchFamily="18" charset="0"/>
                 <a:cs typeface="Times New Roman" panose="02020603050405020304" pitchFamily="18" charset="0"/>
-              </a:rPr>
-              <a:t>Vídeo</a:t>
-            </a:r>
-          </a:p>
-          <a:p>
-            <a:pPr marL="0" indent="0" algn="just">
-              <a:buNone/>
-            </a:pPr>
-            <a:endParaRPr lang="pt-BR" dirty="0">
+                <a:hlinkClick r:id="rId3"/>
+              </a:rPr>
+              <a:t>https://www.targethd.net/a-evolucao-das-linguagens-de-programacao-entre-1965-e-2019/</a:t>
+            </a:r>
+            <a:endParaRPr lang="pt-BR" sz="2400" dirty="0">
               <a:solidFill>
                 <a:schemeClr val="tx1"/>
               </a:solidFill>
@@ -6824,28 +6830,7 @@
             <a:pPr marL="0" indent="0" algn="just">
               <a:buNone/>
             </a:pPr>
-            <a:r>
-              <a:rPr lang="pt-BR" dirty="0">
-                <a:solidFill>
-                  <a:schemeClr val="tx1"/>
-                </a:solidFill>
-                <a:latin typeface="Times New Roman" panose="02020603050405020304" pitchFamily="18" charset="0"/>
-                <a:cs typeface="Times New Roman" panose="02020603050405020304" pitchFamily="18" charset="0"/>
-              </a:rPr>
-              <a:t>	</a:t>
-            </a:r>
-            <a:r>
-              <a:rPr lang="pt-BR" dirty="0">
-                <a:solidFill>
-                  <a:schemeClr val="tx1"/>
-                </a:solidFill>
-                <a:latin typeface="Times New Roman" panose="02020603050405020304" pitchFamily="18" charset="0"/>
-                <a:cs typeface="Times New Roman" panose="02020603050405020304" pitchFamily="18" charset="0"/>
-                <a:hlinkClick r:id="rId3"/>
-              </a:rPr>
-              <a:t>https://www.targethd.net/a-evolucao-das-linguagens-de-programacao-entre-1965-e-2019/</a:t>
-            </a:r>
-            <a:endParaRPr lang="pt-BR" dirty="0">
+            <a:endParaRPr lang="pt-BR" sz="2400" dirty="0">
               <a:solidFill>
                 <a:schemeClr val="tx1"/>
               </a:solidFill>
@@ -6857,13 +6842,104 @@
             <a:pPr marL="0" indent="0" algn="just">
               <a:buNone/>
             </a:pPr>
-            <a:endParaRPr lang="pt-BR" dirty="0">
+            <a:r>
+              <a:rPr lang="pt-BR" sz="2400" dirty="0">
+                <a:solidFill>
+                  <a:schemeClr val="tx1"/>
+                </a:solidFill>
+                <a:latin typeface="Times New Roman" panose="02020603050405020304" pitchFamily="18" charset="0"/>
+                <a:cs typeface="Times New Roman" panose="02020603050405020304" pitchFamily="18" charset="0"/>
+              </a:rPr>
+              <a:t>- Alan Turing – Pai da Computação (</a:t>
+            </a:r>
+            <a:r>
+              <a:rPr lang="pt-BR" sz="2400" b="1" dirty="0">
+                <a:solidFill>
+                  <a:schemeClr val="tx1"/>
+                </a:solidFill>
+                <a:latin typeface="Times New Roman" panose="02020603050405020304" pitchFamily="18" charset="0"/>
+                <a:cs typeface="Times New Roman" panose="02020603050405020304" pitchFamily="18" charset="0"/>
+              </a:rPr>
+              <a:t>Software</a:t>
+            </a:r>
+            <a:r>
+              <a:rPr lang="pt-BR" sz="2400" dirty="0">
+                <a:solidFill>
+                  <a:schemeClr val="tx1"/>
+                </a:solidFill>
+                <a:latin typeface="Times New Roman" panose="02020603050405020304" pitchFamily="18" charset="0"/>
+                <a:cs typeface="Times New Roman" panose="02020603050405020304" pitchFamily="18" charset="0"/>
+              </a:rPr>
+              <a:t>)</a:t>
+            </a:r>
+          </a:p>
+          <a:p>
+            <a:pPr marL="0" indent="0" algn="just">
+              <a:buNone/>
+            </a:pPr>
+            <a:r>
+              <a:rPr lang="pt-BR" sz="2400" dirty="0">
+                <a:solidFill>
+                  <a:schemeClr val="tx1"/>
+                </a:solidFill>
+                <a:latin typeface="Times New Roman" panose="02020603050405020304" pitchFamily="18" charset="0"/>
+                <a:cs typeface="Times New Roman" panose="02020603050405020304" pitchFamily="18" charset="0"/>
+              </a:rPr>
+              <a:t>	</a:t>
+            </a:r>
+            <a:r>
+              <a:rPr lang="pt-BR" sz="2400" dirty="0">
+                <a:solidFill>
+                  <a:schemeClr val="tx1"/>
+                </a:solidFill>
+                <a:latin typeface="Times New Roman" panose="02020603050405020304" pitchFamily="18" charset="0"/>
+                <a:cs typeface="Times New Roman" panose="02020603050405020304" pitchFamily="18" charset="0"/>
+                <a:hlinkClick r:id="rId4"/>
+              </a:rPr>
+              <a:t>https://www.youtube.com/watch?v=5jAq6yU8bxg</a:t>
+            </a:r>
+            <a:endParaRPr lang="pt-BR" sz="2400" dirty="0">
               <a:solidFill>
                 <a:schemeClr val="tx1"/>
               </a:solidFill>
               <a:latin typeface="Times New Roman" panose="02020603050405020304" pitchFamily="18" charset="0"/>
               <a:cs typeface="Times New Roman" panose="02020603050405020304" pitchFamily="18" charset="0"/>
             </a:endParaRPr>
+          </a:p>
+          <a:p>
+            <a:pPr marL="0" indent="0" algn="just">
+              <a:buNone/>
+            </a:pPr>
+            <a:r>
+              <a:rPr lang="pt-BR" sz="2400" dirty="0">
+                <a:solidFill>
+                  <a:schemeClr val="tx1"/>
+                </a:solidFill>
+                <a:latin typeface="Times New Roman" panose="02020603050405020304" pitchFamily="18" charset="0"/>
+                <a:cs typeface="Times New Roman" panose="02020603050405020304" pitchFamily="18" charset="0"/>
+              </a:rPr>
+              <a:t>- John Von Neumann – Arquitetura de Computador (</a:t>
+            </a:r>
+            <a:r>
+              <a:rPr lang="pt-BR" sz="2400" b="1" dirty="0">
+                <a:solidFill>
+                  <a:schemeClr val="tx1"/>
+                </a:solidFill>
+                <a:latin typeface="Times New Roman" panose="02020603050405020304" pitchFamily="18" charset="0"/>
+                <a:cs typeface="Times New Roman" panose="02020603050405020304" pitchFamily="18" charset="0"/>
+              </a:rPr>
+              <a:t>Hardware</a:t>
+            </a:r>
+            <a:r>
+              <a:rPr lang="pt-BR" sz="2400" dirty="0">
+                <a:solidFill>
+                  <a:schemeClr val="tx1"/>
+                </a:solidFill>
+                <a:latin typeface="Times New Roman" panose="02020603050405020304" pitchFamily="18" charset="0"/>
+                <a:cs typeface="Times New Roman" panose="02020603050405020304" pitchFamily="18" charset="0"/>
+              </a:rPr>
+              <a:t>)</a:t>
+            </a:r>
           </a:p>
         </p:txBody>
       </p:sp>
@@ -7267,7 +7343,7 @@
                   <a:schemeClr val="bg1"/>
                 </a:solidFill>
               </a:rPr>
-              <a:t>Aula 03</a:t>
+              <a:t>Aula </a:t>
             </a:r>
             <a:br>
               <a:rPr lang="pt-BR" b="1" dirty="0">

</xml_diff>

<commit_message>
PPTs Teoria de Compiladores - Fasess e MT Yduqs 2022_2 - 27102022
</commit_message>
<xml_diff>
--- a/01 Classes/Aula 03 Teoria de Compiladores - Linguagens de programação.pptx
+++ b/01 Classes/Aula 03 Teoria de Compiladores - Linguagens de programação.pptx
@@ -7338,12 +7338,12 @@
               </a:rPr>
             </a:br>
             <a:r>
-              <a:rPr lang="pt-BR" b="1" dirty="0">
+              <a:rPr lang="pt-BR" b="1">
                 <a:solidFill>
                   <a:schemeClr val="bg1"/>
                 </a:solidFill>
               </a:rPr>
-              <a:t>Aula </a:t>
+              <a:t>Aula 03</a:t>
             </a:r>
             <a:br>
               <a:rPr lang="pt-BR" b="1" dirty="0">

</xml_diff>